<commit_message>
Die Actions sind etwas kompliziert
</commit_message>
<xml_diff>
--- a/Functions/EnergySupplySystem/EnergySupply.pptx
+++ b/Functions/EnergySupplySystem/EnergySupply.pptx
@@ -104,6 +104,11 @@
       </a:defRPr>
     </a:lvl9pPr>
   </p:defaultTextStyle>
+  <p:extLst>
+    <p:ext uri="{EFAFB233-063F-42B5-8137-9DF3F51BA10A}">
+      <p15:sldGuideLst xmlns:p15="http://schemas.microsoft.com/office/powerpoint/2012/main"/>
+    </p:ext>
+  </p:extLst>
 </p:presentation>
 </file>
 
@@ -256,7 +261,7 @@
           <a:p>
             <a:fld id="{FAE71766-2E3A-7E48-A636-4B55A84855C8}" type="datetimeFigureOut">
               <a:rPr lang="en-US" smtClean="0"/>
-              <a:t>2/6/21</a:t>
+              <a:t>2/7/21</a:t>
             </a:fld>
             <a:endParaRPr lang="en-US"/>
           </a:p>
@@ -456,7 +461,7 @@
           <a:p>
             <a:fld id="{FAE71766-2E3A-7E48-A636-4B55A84855C8}" type="datetimeFigureOut">
               <a:rPr lang="en-US" smtClean="0"/>
-              <a:t>2/6/21</a:t>
+              <a:t>2/7/21</a:t>
             </a:fld>
             <a:endParaRPr lang="en-US"/>
           </a:p>
@@ -666,7 +671,7 @@
           <a:p>
             <a:fld id="{FAE71766-2E3A-7E48-A636-4B55A84855C8}" type="datetimeFigureOut">
               <a:rPr lang="en-US" smtClean="0"/>
-              <a:t>2/6/21</a:t>
+              <a:t>2/7/21</a:t>
             </a:fld>
             <a:endParaRPr lang="en-US"/>
           </a:p>
@@ -866,7 +871,7 @@
           <a:p>
             <a:fld id="{FAE71766-2E3A-7E48-A636-4B55A84855C8}" type="datetimeFigureOut">
               <a:rPr lang="en-US" smtClean="0"/>
-              <a:t>2/6/21</a:t>
+              <a:t>2/7/21</a:t>
             </a:fld>
             <a:endParaRPr lang="en-US"/>
           </a:p>
@@ -1142,7 +1147,7 @@
           <a:p>
             <a:fld id="{FAE71766-2E3A-7E48-A636-4B55A84855C8}" type="datetimeFigureOut">
               <a:rPr lang="en-US" smtClean="0"/>
-              <a:t>2/6/21</a:t>
+              <a:t>2/7/21</a:t>
             </a:fld>
             <a:endParaRPr lang="en-US"/>
           </a:p>
@@ -1410,7 +1415,7 @@
           <a:p>
             <a:fld id="{FAE71766-2E3A-7E48-A636-4B55A84855C8}" type="datetimeFigureOut">
               <a:rPr lang="en-US" smtClean="0"/>
-              <a:t>2/6/21</a:t>
+              <a:t>2/7/21</a:t>
             </a:fld>
             <a:endParaRPr lang="en-US"/>
           </a:p>
@@ -1825,7 +1830,7 @@
           <a:p>
             <a:fld id="{FAE71766-2E3A-7E48-A636-4B55A84855C8}" type="datetimeFigureOut">
               <a:rPr lang="en-US" smtClean="0"/>
-              <a:t>2/6/21</a:t>
+              <a:t>2/7/21</a:t>
             </a:fld>
             <a:endParaRPr lang="en-US"/>
           </a:p>
@@ -1967,7 +1972,7 @@
           <a:p>
             <a:fld id="{FAE71766-2E3A-7E48-A636-4B55A84855C8}" type="datetimeFigureOut">
               <a:rPr lang="en-US" smtClean="0"/>
-              <a:t>2/6/21</a:t>
+              <a:t>2/7/21</a:t>
             </a:fld>
             <a:endParaRPr lang="en-US"/>
           </a:p>
@@ -2080,7 +2085,7 @@
           <a:p>
             <a:fld id="{FAE71766-2E3A-7E48-A636-4B55A84855C8}" type="datetimeFigureOut">
               <a:rPr lang="en-US" smtClean="0"/>
-              <a:t>2/6/21</a:t>
+              <a:t>2/7/21</a:t>
             </a:fld>
             <a:endParaRPr lang="en-US"/>
           </a:p>
@@ -2393,7 +2398,7 @@
           <a:p>
             <a:fld id="{FAE71766-2E3A-7E48-A636-4B55A84855C8}" type="datetimeFigureOut">
               <a:rPr lang="en-US" smtClean="0"/>
-              <a:t>2/6/21</a:t>
+              <a:t>2/7/21</a:t>
             </a:fld>
             <a:endParaRPr lang="en-US"/>
           </a:p>
@@ -2682,7 +2687,7 @@
           <a:p>
             <a:fld id="{FAE71766-2E3A-7E48-A636-4B55A84855C8}" type="datetimeFigureOut">
               <a:rPr lang="en-US" smtClean="0"/>
-              <a:t>2/6/21</a:t>
+              <a:t>2/7/21</a:t>
             </a:fld>
             <a:endParaRPr lang="en-US"/>
           </a:p>
@@ -2925,7 +2930,7 @@
           <a:p>
             <a:fld id="{FAE71766-2E3A-7E48-A636-4B55A84855C8}" type="datetimeFigureOut">
               <a:rPr lang="en-US" smtClean="0"/>
-              <a:t>2/6/21</a:t>
+              <a:t>2/7/21</a:t>
             </a:fld>
             <a:endParaRPr lang="en-US"/>
           </a:p>
@@ -3429,8 +3434,8 @@
         </p:nvSpPr>
         <p:spPr>
           <a:xfrm>
-            <a:off x="5568826" y="2783235"/>
-            <a:ext cx="4188952" cy="2054929"/>
+            <a:off x="5568826" y="1544873"/>
+            <a:ext cx="4188952" cy="3293291"/>
           </a:xfrm>
           <a:prstGeom prst="rect">
             <a:avLst/>
@@ -3521,8 +3526,8 @@
         </p:nvSpPr>
         <p:spPr>
           <a:xfrm>
-            <a:off x="6312226" y="3431236"/>
-            <a:ext cx="1080000" cy="1080000"/>
+            <a:off x="6029197" y="2077493"/>
+            <a:ext cx="1776686" cy="2433743"/>
           </a:xfrm>
           <a:prstGeom prst="rect">
             <a:avLst/>
@@ -3593,6 +3598,18 @@
               <a:cs typeface="Arial" panose="020B0604020202020204" pitchFamily="34" charset="0"/>
             </a:endParaRPr>
           </a:p>
+          <a:p>
+            <a:r>
+              <a:rPr lang="en-US" sz="1200" dirty="0">
+                <a:solidFill>
+                  <a:schemeClr val="tx1"/>
+                </a:solidFill>
+                <a:latin typeface="Arial" panose="020B0604020202020204" pitchFamily="34" charset="0"/>
+                <a:cs typeface="Arial" panose="020B0604020202020204" pitchFamily="34" charset="0"/>
+              </a:rPr>
+              <a:t>+ capacity : Real</a:t>
+            </a:r>
+          </a:p>
         </p:txBody>
       </p:sp>
       <p:sp>
@@ -3611,8 +3628,8 @@
         </p:nvSpPr>
         <p:spPr>
           <a:xfrm>
-            <a:off x="8472226" y="3431236"/>
-            <a:ext cx="1080000" cy="1080000"/>
+            <a:off x="8472226" y="2077493"/>
+            <a:ext cx="1080000" cy="2433743"/>
           </a:xfrm>
           <a:prstGeom prst="rect">
             <a:avLst/>
@@ -3687,7 +3704,7 @@
         </p:nvSpPr>
         <p:spPr>
           <a:xfrm>
-            <a:off x="7392226" y="3869742"/>
+            <a:off x="7805883" y="3869742"/>
             <a:ext cx="216000" cy="216000"/>
           </a:xfrm>
           <a:prstGeom prst="rect">
@@ -3719,16 +3736,20 @@
           </a:fontRef>
         </p:style>
         <p:txBody>
-          <a:bodyPr rtlCol="0" anchor="t"/>
-          <a:lstStyle/>
-          <a:p>
-            <a:endParaRPr lang="en-US" sz="1200" dirty="0">
-              <a:solidFill>
-                <a:schemeClr val="tx1"/>
-              </a:solidFill>
-              <a:latin typeface="Arial" panose="020B0604020202020204" pitchFamily="34" charset="0"/>
-              <a:cs typeface="Arial" panose="020B0604020202020204" pitchFamily="34" charset="0"/>
-            </a:endParaRPr>
+          <a:bodyPr rtlCol="0" anchor="ctr"/>
+          <a:lstStyle/>
+          <a:p>
+            <a:pPr algn="ctr"/>
+            <a:r>
+              <a:rPr lang="en-US" sz="1200" dirty="0">
+                <a:solidFill>
+                  <a:schemeClr val="tx1"/>
+                </a:solidFill>
+                <a:latin typeface="Arial" panose="020B0604020202020204" pitchFamily="34" charset="0"/>
+                <a:cs typeface="Arial" panose="020B0604020202020204" pitchFamily="34" charset="0"/>
+              </a:rPr>
+              <a:t>C</a:t>
+            </a:r>
           </a:p>
         </p:txBody>
       </p:sp>
@@ -3748,7 +3769,7 @@
         </p:nvSpPr>
         <p:spPr>
           <a:xfrm>
-            <a:off x="8248625" y="3869742"/>
+            <a:off x="8259511" y="3869742"/>
             <a:ext cx="216000" cy="216000"/>
           </a:xfrm>
           <a:prstGeom prst="rect">
@@ -3780,16 +3801,20 @@
           </a:fontRef>
         </p:style>
         <p:txBody>
-          <a:bodyPr rtlCol="0" anchor="t"/>
-          <a:lstStyle/>
-          <a:p>
-            <a:endParaRPr lang="en-US" sz="1200" dirty="0">
-              <a:solidFill>
-                <a:schemeClr val="tx1"/>
-              </a:solidFill>
-              <a:latin typeface="Arial" panose="020B0604020202020204" pitchFamily="34" charset="0"/>
-              <a:cs typeface="Arial" panose="020B0604020202020204" pitchFamily="34" charset="0"/>
-            </a:endParaRPr>
+          <a:bodyPr rtlCol="0" anchor="ctr"/>
+          <a:lstStyle/>
+          <a:p>
+            <a:pPr algn="ctr"/>
+            <a:r>
+              <a:rPr lang="en-US" sz="1200" dirty="0">
+                <a:solidFill>
+                  <a:schemeClr val="tx1"/>
+                </a:solidFill>
+                <a:latin typeface="Arial" panose="020B0604020202020204" pitchFamily="34" charset="0"/>
+                <a:cs typeface="Arial" panose="020B0604020202020204" pitchFamily="34" charset="0"/>
+              </a:rPr>
+              <a:t>C</a:t>
+            </a:r>
           </a:p>
         </p:txBody>
       </p:sp>
@@ -3809,7 +3834,7 @@
         </p:nvSpPr>
         <p:spPr>
           <a:xfrm>
-            <a:off x="6096226" y="3869742"/>
+            <a:off x="5813197" y="3869742"/>
             <a:ext cx="216000" cy="216000"/>
           </a:xfrm>
           <a:prstGeom prst="rect">
@@ -3841,16 +3866,20 @@
           </a:fontRef>
         </p:style>
         <p:txBody>
-          <a:bodyPr rtlCol="0" anchor="t"/>
-          <a:lstStyle/>
-          <a:p>
-            <a:endParaRPr lang="en-US" sz="1200" dirty="0">
-              <a:solidFill>
-                <a:schemeClr val="tx1"/>
-              </a:solidFill>
-              <a:latin typeface="Arial" panose="020B0604020202020204" pitchFamily="34" charset="0"/>
-              <a:cs typeface="Arial" panose="020B0604020202020204" pitchFamily="34" charset="0"/>
-            </a:endParaRPr>
+          <a:bodyPr rtlCol="0" anchor="ctr"/>
+          <a:lstStyle/>
+          <a:p>
+            <a:pPr algn="ctr"/>
+            <a:r>
+              <a:rPr lang="en-US" sz="1200" dirty="0">
+                <a:solidFill>
+                  <a:schemeClr val="tx1"/>
+                </a:solidFill>
+                <a:latin typeface="Arial" panose="020B0604020202020204" pitchFamily="34" charset="0"/>
+                <a:cs typeface="Arial" panose="020B0604020202020204" pitchFamily="34" charset="0"/>
+              </a:rPr>
+              <a:t>E</a:t>
+            </a:r>
           </a:p>
         </p:txBody>
       </p:sp>
@@ -3871,8 +3900,8 @@
         </p:nvCxnSpPr>
         <p:spPr>
           <a:xfrm>
-            <a:off x="7608226" y="3977742"/>
-            <a:ext cx="640399" cy="0"/>
+            <a:off x="8021883" y="3977742"/>
+            <a:ext cx="237628" cy="0"/>
           </a:xfrm>
           <a:prstGeom prst="straightConnector1">
             <a:avLst/>
@@ -4037,7 +4066,7 @@
         </p:nvSpPr>
         <p:spPr>
           <a:xfrm>
-            <a:off x="6726012" y="5054170"/>
+            <a:off x="6442983" y="5054170"/>
             <a:ext cx="216000" cy="216000"/>
           </a:xfrm>
           <a:prstGeom prst="rect">
@@ -4098,7 +4127,7 @@
         </p:nvSpPr>
         <p:spPr>
           <a:xfrm>
-            <a:off x="6728878" y="4511236"/>
+            <a:off x="6445849" y="4511236"/>
             <a:ext cx="216000" cy="216000"/>
           </a:xfrm>
           <a:prstGeom prst="rect">
@@ -4130,16 +4159,20 @@
           </a:fontRef>
         </p:style>
         <p:txBody>
-          <a:bodyPr rtlCol="0" anchor="t"/>
-          <a:lstStyle/>
-          <a:p>
-            <a:endParaRPr lang="en-US" sz="1200" dirty="0">
-              <a:solidFill>
-                <a:schemeClr val="tx1"/>
-              </a:solidFill>
-              <a:latin typeface="Arial" panose="020B0604020202020204" pitchFamily="34" charset="0"/>
-              <a:cs typeface="Arial" panose="020B0604020202020204" pitchFamily="34" charset="0"/>
-            </a:endParaRPr>
+          <a:bodyPr rtlCol="0" anchor="ctr"/>
+          <a:lstStyle/>
+          <a:p>
+            <a:pPr algn="ctr"/>
+            <a:r>
+              <a:rPr lang="en-US" sz="1200" dirty="0">
+                <a:solidFill>
+                  <a:schemeClr val="tx1"/>
+                </a:solidFill>
+                <a:latin typeface="Arial" panose="020B0604020202020204" pitchFamily="34" charset="0"/>
+                <a:cs typeface="Arial" panose="020B0604020202020204" pitchFamily="34" charset="0"/>
+              </a:rPr>
+              <a:t>L</a:t>
+            </a:r>
           </a:p>
         </p:txBody>
       </p:sp>
@@ -4406,7 +4439,7 @@
         <p:spPr>
           <a:xfrm>
             <a:off x="5576353" y="3977742"/>
-            <a:ext cx="519873" cy="0"/>
+            <a:ext cx="236844" cy="0"/>
           </a:xfrm>
           <a:prstGeom prst="straightConnector1">
             <a:avLst/>
@@ -4614,7 +4647,7 @@
                 <a:latin typeface="Arial" panose="020B0604020202020204" pitchFamily="34" charset="0"/>
                 <a:cs typeface="Arial" panose="020B0604020202020204" pitchFamily="34" charset="0"/>
               </a:rPr>
-              <a:t>Battery</a:t>
+              <a:t>Charger</a:t>
             </a:r>
           </a:p>
           <a:p>
@@ -4626,7 +4659,7 @@
                 <a:latin typeface="Arial" panose="020B0604020202020204" pitchFamily="34" charset="0"/>
                 <a:cs typeface="Arial" panose="020B0604020202020204" pitchFamily="34" charset="0"/>
               </a:rPr>
-              <a:t>b</a:t>
+              <a:t>c</a:t>
             </a:r>
           </a:p>
         </p:txBody>
@@ -4982,7 +5015,7 @@
         </p:nvCxnSpPr>
         <p:spPr>
           <a:xfrm flipH="1">
-            <a:off x="6834012" y="4727236"/>
+            <a:off x="6550983" y="4727236"/>
             <a:ext cx="0" cy="326934"/>
           </a:xfrm>
           <a:prstGeom prst="straightConnector1">
@@ -5071,7 +5104,7 @@
         </p:nvCxnSpPr>
         <p:spPr>
           <a:xfrm flipH="1">
-            <a:off x="6818375" y="5270170"/>
+            <a:off x="6535346" y="5270170"/>
             <a:ext cx="0" cy="326934"/>
           </a:xfrm>
           <a:prstGeom prst="straightConnector1">
@@ -5227,7 +5260,7 @@
         </p:nvSpPr>
         <p:spPr>
           <a:xfrm>
-            <a:off x="5621517" y="5037780"/>
+            <a:off x="5338488" y="5037780"/>
             <a:ext cx="1080000" cy="275347"/>
           </a:xfrm>
           <a:prstGeom prst="rect">
@@ -5279,6 +5312,309 @@
           </a:p>
         </p:txBody>
       </p:sp>
+      <p:sp>
+        <p:nvSpPr>
+          <p:cNvPr id="16" name="Abgerundetes Rechteck 15">
+            <a:extLst>
+              <a:ext uri="{FF2B5EF4-FFF2-40B4-BE49-F238E27FC236}">
+                <a16:creationId xmlns:a16="http://schemas.microsoft.com/office/drawing/2014/main" id="{4081A31D-1240-4740-B6FB-6F0E13CBB8F0}"/>
+              </a:ext>
+            </a:extLst>
+          </p:cNvPr>
+          <p:cNvSpPr/>
+          <p:nvPr/>
+        </p:nvSpPr>
+        <p:spPr>
+          <a:xfrm>
+            <a:off x="6348324" y="3005212"/>
+            <a:ext cx="1111489" cy="287253"/>
+          </a:xfrm>
+          <a:prstGeom prst="roundRect">
+            <a:avLst/>
+          </a:prstGeom>
+          <a:solidFill>
+            <a:srgbClr val="FFFFFF"/>
+          </a:solidFill>
+          <a:ln w="9525">
+            <a:solidFill>
+              <a:schemeClr val="tx1"/>
+            </a:solidFill>
+          </a:ln>
+        </p:spPr>
+        <p:style>
+          <a:lnRef idx="2">
+            <a:schemeClr val="accent1">
+              <a:shade val="50000"/>
+            </a:schemeClr>
+          </a:lnRef>
+          <a:fillRef idx="1">
+            <a:schemeClr val="accent1"/>
+          </a:fillRef>
+          <a:effectRef idx="0">
+            <a:schemeClr val="accent1"/>
+          </a:effectRef>
+          <a:fontRef idx="minor">
+            <a:schemeClr val="lt1"/>
+          </a:fontRef>
+        </p:style>
+        <p:txBody>
+          <a:bodyPr lIns="0" tIns="0" rIns="0" bIns="0" rtlCol="0" anchor="ctr"/>
+          <a:lstStyle/>
+          <a:p>
+            <a:pPr algn="ctr"/>
+            <a:r>
+              <a:rPr lang="en-US" sz="1000" dirty="0">
+                <a:solidFill>
+                  <a:schemeClr val="tx1"/>
+                </a:solidFill>
+                <a:latin typeface="Arial" panose="020B0604020202020204" pitchFamily="34" charset="0"/>
+                <a:cs typeface="Arial" panose="020B0604020202020204" pitchFamily="34" charset="0"/>
+              </a:rPr>
+              <a:t>L = E / capacity</a:t>
+            </a:r>
+          </a:p>
+        </p:txBody>
+      </p:sp>
+      <p:sp>
+        <p:nvSpPr>
+          <p:cNvPr id="41" name="Abgerundetes Rechteck 40">
+            <a:extLst>
+              <a:ext uri="{FF2B5EF4-FFF2-40B4-BE49-F238E27FC236}">
+                <a16:creationId xmlns:a16="http://schemas.microsoft.com/office/drawing/2014/main" id="{E0F18382-7085-224E-922D-4B3C0B006326}"/>
+              </a:ext>
+            </a:extLst>
+          </p:cNvPr>
+          <p:cNvSpPr/>
+          <p:nvPr/>
+        </p:nvSpPr>
+        <p:spPr>
+          <a:xfrm>
+            <a:off x="6348324" y="3523979"/>
+            <a:ext cx="1111489" cy="660324"/>
+          </a:xfrm>
+          <a:prstGeom prst="roundRect">
+            <a:avLst>
+              <a:gd name="adj" fmla="val 9459"/>
+            </a:avLst>
+          </a:prstGeom>
+          <a:solidFill>
+            <a:srgbClr val="FFFFFF"/>
+          </a:solidFill>
+          <a:ln w="9525">
+            <a:solidFill>
+              <a:schemeClr val="tx1"/>
+            </a:solidFill>
+          </a:ln>
+        </p:spPr>
+        <p:style>
+          <a:lnRef idx="2">
+            <a:schemeClr val="accent1">
+              <a:shade val="50000"/>
+            </a:schemeClr>
+          </a:lnRef>
+          <a:fillRef idx="1">
+            <a:schemeClr val="accent1"/>
+          </a:fillRef>
+          <a:effectRef idx="0">
+            <a:schemeClr val="accent1"/>
+          </a:effectRef>
+          <a:fontRef idx="minor">
+            <a:schemeClr val="lt1"/>
+          </a:fontRef>
+        </p:style>
+        <p:txBody>
+          <a:bodyPr lIns="0" tIns="0" rIns="0" bIns="0" rtlCol="0" anchor="ctr"/>
+          <a:lstStyle/>
+          <a:p>
+            <a:pPr algn="ctr"/>
+            <a:r>
+              <a:rPr lang="en-US" sz="1000" dirty="0">
+                <a:solidFill>
+                  <a:schemeClr val="tx1"/>
+                </a:solidFill>
+                <a:latin typeface="Arial" panose="020B0604020202020204" pitchFamily="34" charset="0"/>
+                <a:cs typeface="Arial" panose="020B0604020202020204" pitchFamily="34" charset="0"/>
+              </a:rPr>
+              <a:t>var t = Y</a:t>
+            </a:r>
+          </a:p>
+          <a:p>
+            <a:pPr algn="ctr"/>
+            <a:r>
+              <a:rPr lang="en-US" sz="1000" dirty="0">
+                <a:solidFill>
+                  <a:schemeClr val="tx1"/>
+                </a:solidFill>
+                <a:latin typeface="Arial" panose="020B0604020202020204" pitchFamily="34" charset="0"/>
+                <a:cs typeface="Arial" panose="020B0604020202020204" pitchFamily="34" charset="0"/>
+              </a:rPr>
+              <a:t>If (L&lt; 20) t = R</a:t>
+            </a:r>
+          </a:p>
+          <a:p>
+            <a:pPr algn="ctr"/>
+            <a:r>
+              <a:rPr lang="en-US" sz="1000" dirty="0">
+                <a:solidFill>
+                  <a:schemeClr val="tx1"/>
+                </a:solidFill>
+                <a:latin typeface="Arial" panose="020B0604020202020204" pitchFamily="34" charset="0"/>
+                <a:cs typeface="Arial" panose="020B0604020202020204" pitchFamily="34" charset="0"/>
+              </a:rPr>
+              <a:t>If (L&gt; 80) t = G</a:t>
+            </a:r>
+          </a:p>
+          <a:p>
+            <a:pPr algn="ctr"/>
+            <a:r>
+              <a:rPr lang="en-US" sz="1000" dirty="0">
+                <a:solidFill>
+                  <a:schemeClr val="tx1"/>
+                </a:solidFill>
+                <a:latin typeface="Arial" panose="020B0604020202020204" pitchFamily="34" charset="0"/>
+                <a:cs typeface="Arial" panose="020B0604020202020204" pitchFamily="34" charset="0"/>
+              </a:rPr>
+              <a:t>C = t</a:t>
+            </a:r>
+          </a:p>
+        </p:txBody>
+      </p:sp>
+      <p:cxnSp>
+        <p:nvCxnSpPr>
+          <p:cNvPr id="44" name="Gerade Verbindung mit Pfeil 43">
+            <a:extLst>
+              <a:ext uri="{FF2B5EF4-FFF2-40B4-BE49-F238E27FC236}">
+                <a16:creationId xmlns:a16="http://schemas.microsoft.com/office/drawing/2014/main" id="{C09D0C6C-6E3F-E840-B380-E61186F83340}"/>
+              </a:ext>
+            </a:extLst>
+          </p:cNvPr>
+          <p:cNvCxnSpPr>
+            <a:cxnSpLocks/>
+          </p:cNvCxnSpPr>
+          <p:nvPr/>
+        </p:nvCxnSpPr>
+        <p:spPr>
+          <a:xfrm>
+            <a:off x="6901821" y="2786387"/>
+            <a:ext cx="0" cy="218825"/>
+          </a:xfrm>
+          <a:prstGeom prst="straightConnector1">
+            <a:avLst/>
+          </a:prstGeom>
+          <a:ln w="9525">
+            <a:solidFill>
+              <a:schemeClr val="tx1"/>
+            </a:solidFill>
+            <a:headEnd type="oval" w="med" len="med"/>
+            <a:tailEnd type="triangle" w="med" len="med"/>
+          </a:ln>
+        </p:spPr>
+        <p:style>
+          <a:lnRef idx="1">
+            <a:schemeClr val="accent1"/>
+          </a:lnRef>
+          <a:fillRef idx="0">
+            <a:schemeClr val="accent1"/>
+          </a:fillRef>
+          <a:effectRef idx="0">
+            <a:schemeClr val="accent1"/>
+          </a:effectRef>
+          <a:fontRef idx="minor">
+            <a:schemeClr val="tx1"/>
+          </a:fontRef>
+        </p:style>
+      </p:cxnSp>
+      <p:cxnSp>
+        <p:nvCxnSpPr>
+          <p:cNvPr id="19" name="Gerade Verbindung mit Pfeil 18">
+            <a:extLst>
+              <a:ext uri="{FF2B5EF4-FFF2-40B4-BE49-F238E27FC236}">
+                <a16:creationId xmlns:a16="http://schemas.microsoft.com/office/drawing/2014/main" id="{E24F75EF-6050-2540-8AC2-E72F3A71BFCB}"/>
+              </a:ext>
+            </a:extLst>
+          </p:cNvPr>
+          <p:cNvCxnSpPr>
+            <a:cxnSpLocks/>
+            <a:stCxn id="16" idx="2"/>
+            <a:endCxn id="41" idx="0"/>
+          </p:cNvCxnSpPr>
+          <p:nvPr/>
+        </p:nvCxnSpPr>
+        <p:spPr>
+          <a:xfrm>
+            <a:off x="6904069" y="3292465"/>
+            <a:ext cx="0" cy="231514"/>
+          </a:xfrm>
+          <a:prstGeom prst="straightConnector1">
+            <a:avLst/>
+          </a:prstGeom>
+          <a:ln w="9525">
+            <a:solidFill>
+              <a:schemeClr val="tx1"/>
+            </a:solidFill>
+            <a:tailEnd type="triangle"/>
+          </a:ln>
+        </p:spPr>
+        <p:style>
+          <a:lnRef idx="1">
+            <a:schemeClr val="accent1"/>
+          </a:lnRef>
+          <a:fillRef idx="0">
+            <a:schemeClr val="accent1"/>
+          </a:fillRef>
+          <a:effectRef idx="0">
+            <a:schemeClr val="accent1"/>
+          </a:effectRef>
+          <a:fontRef idx="minor">
+            <a:schemeClr val="tx1"/>
+          </a:fontRef>
+        </p:style>
+      </p:cxnSp>
+      <p:cxnSp>
+        <p:nvCxnSpPr>
+          <p:cNvPr id="51" name="Gerade Verbindung mit Pfeil 50">
+            <a:extLst>
+              <a:ext uri="{FF2B5EF4-FFF2-40B4-BE49-F238E27FC236}">
+                <a16:creationId xmlns:a16="http://schemas.microsoft.com/office/drawing/2014/main" id="{88CCE8E0-9311-714B-9E94-0DF908EB6E93}"/>
+              </a:ext>
+            </a:extLst>
+          </p:cNvPr>
+          <p:cNvCxnSpPr>
+            <a:cxnSpLocks/>
+          </p:cNvCxnSpPr>
+          <p:nvPr/>
+        </p:nvCxnSpPr>
+        <p:spPr>
+          <a:xfrm>
+            <a:off x="6901821" y="4184303"/>
+            <a:ext cx="0" cy="231514"/>
+          </a:xfrm>
+          <a:prstGeom prst="straightConnector1">
+            <a:avLst/>
+          </a:prstGeom>
+          <a:ln w="9525">
+            <a:solidFill>
+              <a:schemeClr val="tx1"/>
+            </a:solidFill>
+            <a:headEnd type="none"/>
+            <a:tailEnd type="oval"/>
+          </a:ln>
+        </p:spPr>
+        <p:style>
+          <a:lnRef idx="1">
+            <a:schemeClr val="accent1"/>
+          </a:lnRef>
+          <a:fillRef idx="0">
+            <a:schemeClr val="accent1"/>
+          </a:fillRef>
+          <a:effectRef idx="0">
+            <a:schemeClr val="accent1"/>
+          </a:effectRef>
+          <a:fontRef idx="minor">
+            <a:schemeClr val="tx1"/>
+          </a:fontRef>
+        </p:style>
+      </p:cxnSp>
     </p:spTree>
     <p:extLst>
       <p:ext uri="{BB962C8B-B14F-4D97-AF65-F5344CB8AC3E}">

</xml_diff>

<commit_message>
Running changes aus unserem Meeting
</commit_message>
<xml_diff>
--- a/Functions/EnergySupplySystem/EnergySupply.pptx
+++ b/Functions/EnergySupplySystem/EnergySupply.pptx
@@ -261,7 +261,7 @@
           <a:p>
             <a:fld id="{FAE71766-2E3A-7E48-A636-4B55A84855C8}" type="datetimeFigureOut">
               <a:rPr lang="en-US" smtClean="0"/>
-              <a:t>2/7/21</a:t>
+              <a:t>2/10/21</a:t>
             </a:fld>
             <a:endParaRPr lang="en-US"/>
           </a:p>
@@ -461,7 +461,7 @@
           <a:p>
             <a:fld id="{FAE71766-2E3A-7E48-A636-4B55A84855C8}" type="datetimeFigureOut">
               <a:rPr lang="en-US" smtClean="0"/>
-              <a:t>2/7/21</a:t>
+              <a:t>2/10/21</a:t>
             </a:fld>
             <a:endParaRPr lang="en-US"/>
           </a:p>
@@ -671,7 +671,7 @@
           <a:p>
             <a:fld id="{FAE71766-2E3A-7E48-A636-4B55A84855C8}" type="datetimeFigureOut">
               <a:rPr lang="en-US" smtClean="0"/>
-              <a:t>2/7/21</a:t>
+              <a:t>2/10/21</a:t>
             </a:fld>
             <a:endParaRPr lang="en-US"/>
           </a:p>
@@ -871,7 +871,7 @@
           <a:p>
             <a:fld id="{FAE71766-2E3A-7E48-A636-4B55A84855C8}" type="datetimeFigureOut">
               <a:rPr lang="en-US" smtClean="0"/>
-              <a:t>2/7/21</a:t>
+              <a:t>2/10/21</a:t>
             </a:fld>
             <a:endParaRPr lang="en-US"/>
           </a:p>
@@ -1147,7 +1147,7 @@
           <a:p>
             <a:fld id="{FAE71766-2E3A-7E48-A636-4B55A84855C8}" type="datetimeFigureOut">
               <a:rPr lang="en-US" smtClean="0"/>
-              <a:t>2/7/21</a:t>
+              <a:t>2/10/21</a:t>
             </a:fld>
             <a:endParaRPr lang="en-US"/>
           </a:p>
@@ -1415,7 +1415,7 @@
           <a:p>
             <a:fld id="{FAE71766-2E3A-7E48-A636-4B55A84855C8}" type="datetimeFigureOut">
               <a:rPr lang="en-US" smtClean="0"/>
-              <a:t>2/7/21</a:t>
+              <a:t>2/10/21</a:t>
             </a:fld>
             <a:endParaRPr lang="en-US"/>
           </a:p>
@@ -1830,7 +1830,7 @@
           <a:p>
             <a:fld id="{FAE71766-2E3A-7E48-A636-4B55A84855C8}" type="datetimeFigureOut">
               <a:rPr lang="en-US" smtClean="0"/>
-              <a:t>2/7/21</a:t>
+              <a:t>2/10/21</a:t>
             </a:fld>
             <a:endParaRPr lang="en-US"/>
           </a:p>
@@ -1972,7 +1972,7 @@
           <a:p>
             <a:fld id="{FAE71766-2E3A-7E48-A636-4B55A84855C8}" type="datetimeFigureOut">
               <a:rPr lang="en-US" smtClean="0"/>
-              <a:t>2/7/21</a:t>
+              <a:t>2/10/21</a:t>
             </a:fld>
             <a:endParaRPr lang="en-US"/>
           </a:p>
@@ -2085,7 +2085,7 @@
           <a:p>
             <a:fld id="{FAE71766-2E3A-7E48-A636-4B55A84855C8}" type="datetimeFigureOut">
               <a:rPr lang="en-US" smtClean="0"/>
-              <a:t>2/7/21</a:t>
+              <a:t>2/10/21</a:t>
             </a:fld>
             <a:endParaRPr lang="en-US"/>
           </a:p>
@@ -2398,7 +2398,7 @@
           <a:p>
             <a:fld id="{FAE71766-2E3A-7E48-A636-4B55A84855C8}" type="datetimeFigureOut">
               <a:rPr lang="en-US" smtClean="0"/>
-              <a:t>2/7/21</a:t>
+              <a:t>2/10/21</a:t>
             </a:fld>
             <a:endParaRPr lang="en-US"/>
           </a:p>
@@ -2687,7 +2687,7 @@
           <a:p>
             <a:fld id="{FAE71766-2E3A-7E48-A636-4B55A84855C8}" type="datetimeFigureOut">
               <a:rPr lang="en-US" smtClean="0"/>
-              <a:t>2/7/21</a:t>
+              <a:t>2/10/21</a:t>
             </a:fld>
             <a:endParaRPr lang="en-US"/>
           </a:p>
@@ -2930,7 +2930,7 @@
           <a:p>
             <a:fld id="{FAE71766-2E3A-7E48-A636-4B55A84855C8}" type="datetimeFigureOut">
               <a:rPr lang="en-US" smtClean="0"/>
-              <a:t>2/7/21</a:t>
+              <a:t>2/10/21</a:t>
             </a:fld>
             <a:endParaRPr lang="en-US"/>
           </a:p>
@@ -5598,6 +5598,288 @@
             </a:solidFill>
             <a:headEnd type="none"/>
             <a:tailEnd type="oval"/>
+          </a:ln>
+        </p:spPr>
+        <p:style>
+          <a:lnRef idx="1">
+            <a:schemeClr val="accent1"/>
+          </a:lnRef>
+          <a:fillRef idx="0">
+            <a:schemeClr val="accent1"/>
+          </a:fillRef>
+          <a:effectRef idx="0">
+            <a:schemeClr val="accent1"/>
+          </a:effectRef>
+          <a:fontRef idx="minor">
+            <a:schemeClr val="tx1"/>
+          </a:fontRef>
+        </p:style>
+      </p:cxnSp>
+      <p:sp>
+        <p:nvSpPr>
+          <p:cNvPr id="39" name="Rechteck 38">
+            <a:extLst>
+              <a:ext uri="{FF2B5EF4-FFF2-40B4-BE49-F238E27FC236}">
+                <a16:creationId xmlns:a16="http://schemas.microsoft.com/office/drawing/2014/main" id="{204F8711-DBBF-E04D-ABBD-2F0D5DC0C25D}"/>
+              </a:ext>
+            </a:extLst>
+          </p:cNvPr>
+          <p:cNvSpPr>
+            <a:spLocks noChangeAspect="1"/>
+          </p:cNvSpPr>
+          <p:nvPr/>
+        </p:nvSpPr>
+        <p:spPr>
+          <a:xfrm>
+            <a:off x="3545189" y="2642978"/>
+            <a:ext cx="216000" cy="216000"/>
+          </a:xfrm>
+          <a:prstGeom prst="rect">
+            <a:avLst/>
+          </a:prstGeom>
+          <a:solidFill>
+            <a:srgbClr val="FFFFFF"/>
+          </a:solidFill>
+          <a:ln w="9525">
+            <a:solidFill>
+              <a:schemeClr val="tx1"/>
+            </a:solidFill>
+          </a:ln>
+        </p:spPr>
+        <p:style>
+          <a:lnRef idx="2">
+            <a:schemeClr val="accent1">
+              <a:shade val="50000"/>
+            </a:schemeClr>
+          </a:lnRef>
+          <a:fillRef idx="1">
+            <a:schemeClr val="accent1"/>
+          </a:fillRef>
+          <a:effectRef idx="0">
+            <a:schemeClr val="accent1"/>
+          </a:effectRef>
+          <a:fontRef idx="minor">
+            <a:schemeClr val="lt1"/>
+          </a:fontRef>
+        </p:style>
+        <p:txBody>
+          <a:bodyPr rtlCol="0" anchor="t"/>
+          <a:lstStyle/>
+          <a:p>
+            <a:endParaRPr lang="en-US" sz="1200" dirty="0">
+              <a:solidFill>
+                <a:schemeClr val="tx1"/>
+              </a:solidFill>
+              <a:latin typeface="Arial" panose="020B0604020202020204" pitchFamily="34" charset="0"/>
+              <a:cs typeface="Arial" panose="020B0604020202020204" pitchFamily="34" charset="0"/>
+            </a:endParaRPr>
+          </a:p>
+        </p:txBody>
+      </p:sp>
+      <p:sp>
+        <p:nvSpPr>
+          <p:cNvPr id="40" name="Rechteck 39">
+            <a:extLst>
+              <a:ext uri="{FF2B5EF4-FFF2-40B4-BE49-F238E27FC236}">
+                <a16:creationId xmlns:a16="http://schemas.microsoft.com/office/drawing/2014/main" id="{7C884B2B-0034-DB48-93F3-E53C8C6F208E}"/>
+              </a:ext>
+            </a:extLst>
+          </p:cNvPr>
+          <p:cNvSpPr>
+            <a:spLocks noChangeAspect="1"/>
+          </p:cNvSpPr>
+          <p:nvPr/>
+        </p:nvSpPr>
+        <p:spPr>
+          <a:xfrm>
+            <a:off x="3545189" y="3219357"/>
+            <a:ext cx="216000" cy="216000"/>
+          </a:xfrm>
+          <a:prstGeom prst="rect">
+            <a:avLst/>
+          </a:prstGeom>
+          <a:solidFill>
+            <a:srgbClr val="FFFFFF"/>
+          </a:solidFill>
+          <a:ln w="9525">
+            <a:solidFill>
+              <a:schemeClr val="tx1"/>
+            </a:solidFill>
+          </a:ln>
+        </p:spPr>
+        <p:style>
+          <a:lnRef idx="2">
+            <a:schemeClr val="accent1">
+              <a:shade val="50000"/>
+            </a:schemeClr>
+          </a:lnRef>
+          <a:fillRef idx="1">
+            <a:schemeClr val="accent1"/>
+          </a:fillRef>
+          <a:effectRef idx="0">
+            <a:schemeClr val="accent1"/>
+          </a:effectRef>
+          <a:fontRef idx="minor">
+            <a:schemeClr val="lt1"/>
+          </a:fontRef>
+        </p:style>
+        <p:txBody>
+          <a:bodyPr rtlCol="0" anchor="t"/>
+          <a:lstStyle/>
+          <a:p>
+            <a:endParaRPr lang="en-US" sz="1200" dirty="0">
+              <a:solidFill>
+                <a:schemeClr val="tx1"/>
+              </a:solidFill>
+              <a:latin typeface="Arial" panose="020B0604020202020204" pitchFamily="34" charset="0"/>
+              <a:cs typeface="Arial" panose="020B0604020202020204" pitchFamily="34" charset="0"/>
+            </a:endParaRPr>
+          </a:p>
+        </p:txBody>
+      </p:sp>
+      <p:cxnSp>
+        <p:nvCxnSpPr>
+          <p:cNvPr id="45" name="Gerade Verbindung mit Pfeil 44">
+            <a:extLst>
+              <a:ext uri="{FF2B5EF4-FFF2-40B4-BE49-F238E27FC236}">
+                <a16:creationId xmlns:a16="http://schemas.microsoft.com/office/drawing/2014/main" id="{6940668B-5FE2-1641-A966-58AAEEC14DA5}"/>
+              </a:ext>
+            </a:extLst>
+          </p:cNvPr>
+          <p:cNvCxnSpPr>
+            <a:cxnSpLocks/>
+            <a:stCxn id="39" idx="2"/>
+            <a:endCxn id="40" idx="0"/>
+          </p:cNvCxnSpPr>
+          <p:nvPr/>
+        </p:nvCxnSpPr>
+        <p:spPr>
+          <a:xfrm>
+            <a:off x="3653189" y="2858978"/>
+            <a:ext cx="0" cy="360379"/>
+          </a:xfrm>
+          <a:prstGeom prst="straightConnector1">
+            <a:avLst/>
+          </a:prstGeom>
+          <a:ln w="9525">
+            <a:solidFill>
+              <a:schemeClr val="tx1"/>
+            </a:solidFill>
+            <a:headEnd type="triangle" w="med" len="med"/>
+            <a:tailEnd type="none" w="med" len="med"/>
+          </a:ln>
+        </p:spPr>
+        <p:style>
+          <a:lnRef idx="1">
+            <a:schemeClr val="accent1"/>
+          </a:lnRef>
+          <a:fillRef idx="0">
+            <a:schemeClr val="accent1"/>
+          </a:fillRef>
+          <a:effectRef idx="0">
+            <a:schemeClr val="accent1"/>
+          </a:effectRef>
+          <a:fontRef idx="minor">
+            <a:schemeClr val="tx1"/>
+          </a:fontRef>
+        </p:style>
+      </p:cxnSp>
+      <p:sp>
+        <p:nvSpPr>
+          <p:cNvPr id="52" name="Rechteck 51">
+            <a:extLst>
+              <a:ext uri="{FF2B5EF4-FFF2-40B4-BE49-F238E27FC236}">
+                <a16:creationId xmlns:a16="http://schemas.microsoft.com/office/drawing/2014/main" id="{C4279629-269B-B645-A858-2398B74DAFCF}"/>
+              </a:ext>
+            </a:extLst>
+          </p:cNvPr>
+          <p:cNvSpPr>
+            <a:spLocks noChangeAspect="1"/>
+          </p:cNvSpPr>
+          <p:nvPr/>
+        </p:nvSpPr>
+        <p:spPr>
+          <a:xfrm>
+            <a:off x="8904226" y="1854671"/>
+            <a:ext cx="216000" cy="216000"/>
+          </a:xfrm>
+          <a:prstGeom prst="rect">
+            <a:avLst/>
+          </a:prstGeom>
+          <a:solidFill>
+            <a:srgbClr val="FFFFFF"/>
+          </a:solidFill>
+          <a:ln w="9525">
+            <a:solidFill>
+              <a:schemeClr val="tx1"/>
+            </a:solidFill>
+          </a:ln>
+        </p:spPr>
+        <p:style>
+          <a:lnRef idx="2">
+            <a:schemeClr val="accent1">
+              <a:shade val="50000"/>
+            </a:schemeClr>
+          </a:lnRef>
+          <a:fillRef idx="1">
+            <a:schemeClr val="accent1"/>
+          </a:fillRef>
+          <a:effectRef idx="0">
+            <a:schemeClr val="accent1"/>
+          </a:effectRef>
+          <a:fontRef idx="minor">
+            <a:schemeClr val="lt1"/>
+          </a:fontRef>
+        </p:style>
+        <p:txBody>
+          <a:bodyPr rtlCol="0" anchor="ctr"/>
+          <a:lstStyle/>
+          <a:p>
+            <a:pPr algn="ctr"/>
+            <a:r>
+              <a:rPr lang="en-US" sz="1200" dirty="0">
+                <a:solidFill>
+                  <a:schemeClr val="tx1"/>
+                </a:solidFill>
+                <a:latin typeface="Arial" panose="020B0604020202020204" pitchFamily="34" charset="0"/>
+                <a:cs typeface="Arial" panose="020B0604020202020204" pitchFamily="34" charset="0"/>
+              </a:rPr>
+              <a:t>E</a:t>
+            </a:r>
+          </a:p>
+        </p:txBody>
+      </p:sp>
+      <p:cxnSp>
+        <p:nvCxnSpPr>
+          <p:cNvPr id="3" name="Gewinkelte Verbindung 2">
+            <a:extLst>
+              <a:ext uri="{FF2B5EF4-FFF2-40B4-BE49-F238E27FC236}">
+                <a16:creationId xmlns:a16="http://schemas.microsoft.com/office/drawing/2014/main" id="{9F0C2ADF-DB5C-ED43-9ADC-C937951F1499}"/>
+              </a:ext>
+            </a:extLst>
+          </p:cNvPr>
+          <p:cNvCxnSpPr>
+            <a:cxnSpLocks/>
+            <a:stCxn id="21" idx="3"/>
+            <a:endCxn id="52" idx="1"/>
+          </p:cNvCxnSpPr>
+          <p:nvPr/>
+        </p:nvCxnSpPr>
+        <p:spPr>
+          <a:xfrm flipV="1">
+            <a:off x="5576353" y="1962671"/>
+            <a:ext cx="3327873" cy="2015071"/>
+          </a:xfrm>
+          <a:prstGeom prst="bentConnector3">
+            <a:avLst>
+              <a:gd name="adj1" fmla="val 3696"/>
+            </a:avLst>
+          </a:prstGeom>
+          <a:ln w="9525">
+            <a:solidFill>
+              <a:schemeClr val="tx1"/>
+            </a:solidFill>
+            <a:tailEnd type="triangle"/>
           </a:ln>
         </p:spPr>
         <p:style>

</xml_diff>